<commit_message>
Updated Powerpoint - added Intro slide
</commit_message>
<xml_diff>
--- a/ML4EO Workshop.pptx
+++ b/ML4EO Workshop.pptx
@@ -7,10 +7,12 @@
   <p:sldIdLst>
     <p:sldId id="256" r:id="rId2"/>
     <p:sldId id="257" r:id="rId3"/>
-    <p:sldId id="259" r:id="rId4"/>
-    <p:sldId id="258" r:id="rId5"/>
-    <p:sldId id="260" r:id="rId6"/>
-    <p:sldId id="261" r:id="rId7"/>
+    <p:sldId id="262" r:id="rId4"/>
+    <p:sldId id="263" r:id="rId5"/>
+    <p:sldId id="259" r:id="rId6"/>
+    <p:sldId id="258" r:id="rId7"/>
+    <p:sldId id="260" r:id="rId8"/>
+    <p:sldId id="261" r:id="rId9"/>
   </p:sldIdLst>
   <p:sldSz cx="12192000" cy="6858000"/>
   <p:notesSz cx="6858000" cy="9144000"/>
@@ -109,6 +111,11 @@
       </a:defRPr>
     </a:lvl9pPr>
   </p:defaultTextStyle>
+  <p:extLst>
+    <p:ext uri="{EFAFB233-063F-42B5-8137-9DF3F51BA10A}">
+      <p15:sldGuideLst xmlns:p15="http://schemas.microsoft.com/office/powerpoint/2012/main"/>
+    </p:ext>
+  </p:extLst>
 </p:presentation>
 </file>
 
@@ -462,7 +469,7 @@
           </a:lstStyle>
           <a:p>
             <a:r>
-              <a:rPr lang="en-US" smtClean="0"/>
+              <a:rPr lang="en-US"/>
               <a:t>Click to edit Master title style</a:t>
             </a:r>
             <a:endParaRPr lang="en-US" dirty="0"/>
@@ -536,7 +543,7 @@
           </a:lstStyle>
           <a:p>
             <a:r>
-              <a:rPr lang="en-US" smtClean="0"/>
+              <a:rPr lang="en-US"/>
               <a:t>Click to edit Master subtitle style</a:t>
             </a:r>
             <a:endParaRPr lang="en-US" dirty="0"/>
@@ -574,7 +581,7 @@
           <a:p>
             <a:fld id="{7CFA13FA-1D80-4FB4-8271-48F38922699E}" type="datetimeFigureOut">
               <a:rPr lang="en-ZA" smtClean="0"/>
-              <a:t>2021/07/05</a:t>
+              <a:t>2021/07/09</a:t>
             </a:fld>
             <a:endParaRPr lang="en-ZA"/>
           </a:p>
@@ -700,7 +707,7 @@
           <a:lstStyle/>
           <a:p>
             <a:r>
-              <a:rPr lang="en-US" smtClean="0"/>
+              <a:rPr lang="en-US"/>
               <a:t>Click to edit Master title style</a:t>
             </a:r>
             <a:endParaRPr lang="en-US" dirty="0"/>
@@ -724,35 +731,35 @@
           <a:p>
             <a:pPr lvl="0"/>
             <a:r>
-              <a:rPr lang="en-US" smtClean="0"/>
+              <a:rPr lang="en-US"/>
               <a:t>Edit Master text styles</a:t>
             </a:r>
           </a:p>
           <a:p>
             <a:pPr lvl="1"/>
             <a:r>
-              <a:rPr lang="en-US" smtClean="0"/>
+              <a:rPr lang="en-US"/>
               <a:t>Second level</a:t>
             </a:r>
           </a:p>
           <a:p>
             <a:pPr lvl="2"/>
             <a:r>
-              <a:rPr lang="en-US" smtClean="0"/>
+              <a:rPr lang="en-US"/>
               <a:t>Third level</a:t>
             </a:r>
           </a:p>
           <a:p>
             <a:pPr lvl="3"/>
             <a:r>
-              <a:rPr lang="en-US" smtClean="0"/>
+              <a:rPr lang="en-US"/>
               <a:t>Fourth level</a:t>
             </a:r>
           </a:p>
           <a:p>
             <a:pPr lvl="4"/>
             <a:r>
-              <a:rPr lang="en-US" smtClean="0"/>
+              <a:rPr lang="en-US"/>
               <a:t>Fifth level</a:t>
             </a:r>
             <a:endParaRPr lang="en-US" dirty="0"/>
@@ -776,7 +783,7 @@
           <a:p>
             <a:fld id="{7CFA13FA-1D80-4FB4-8271-48F38922699E}" type="datetimeFigureOut">
               <a:rPr lang="en-ZA" smtClean="0"/>
-              <a:t>2021/07/05</a:t>
+              <a:t>2021/07/09</a:t>
             </a:fld>
             <a:endParaRPr lang="en-ZA"/>
           </a:p>
@@ -875,7 +882,7 @@
           <a:lstStyle/>
           <a:p>
             <a:r>
-              <a:rPr lang="en-US" smtClean="0"/>
+              <a:rPr lang="en-US"/>
               <a:t>Click to edit Master title style</a:t>
             </a:r>
             <a:endParaRPr lang="en-US" dirty="0"/>
@@ -904,35 +911,35 @@
           <a:p>
             <a:pPr lvl="0"/>
             <a:r>
-              <a:rPr lang="en-US" smtClean="0"/>
+              <a:rPr lang="en-US"/>
               <a:t>Edit Master text styles</a:t>
             </a:r>
           </a:p>
           <a:p>
             <a:pPr lvl="1"/>
             <a:r>
-              <a:rPr lang="en-US" smtClean="0"/>
+              <a:rPr lang="en-US"/>
               <a:t>Second level</a:t>
             </a:r>
           </a:p>
           <a:p>
             <a:pPr lvl="2"/>
             <a:r>
-              <a:rPr lang="en-US" smtClean="0"/>
+              <a:rPr lang="en-US"/>
               <a:t>Third level</a:t>
             </a:r>
           </a:p>
           <a:p>
             <a:pPr lvl="3"/>
             <a:r>
-              <a:rPr lang="en-US" smtClean="0"/>
+              <a:rPr lang="en-US"/>
               <a:t>Fourth level</a:t>
             </a:r>
           </a:p>
           <a:p>
             <a:pPr lvl="4"/>
             <a:r>
-              <a:rPr lang="en-US" smtClean="0"/>
+              <a:rPr lang="en-US"/>
               <a:t>Fifth level</a:t>
             </a:r>
             <a:endParaRPr lang="en-US" dirty="0"/>
@@ -956,7 +963,7 @@
           <a:p>
             <a:fld id="{7CFA13FA-1D80-4FB4-8271-48F38922699E}" type="datetimeFigureOut">
               <a:rPr lang="en-ZA" smtClean="0"/>
-              <a:t>2021/07/05</a:t>
+              <a:t>2021/07/09</a:t>
             </a:fld>
             <a:endParaRPr lang="en-ZA"/>
           </a:p>
@@ -1050,7 +1057,7 @@
           <a:lstStyle/>
           <a:p>
             <a:r>
-              <a:rPr lang="en-US" smtClean="0"/>
+              <a:rPr lang="en-US"/>
               <a:t>Click to edit Master title style</a:t>
             </a:r>
             <a:endParaRPr lang="en-US" dirty="0"/>
@@ -1074,35 +1081,35 @@
           <a:p>
             <a:pPr lvl="0"/>
             <a:r>
-              <a:rPr lang="en-US" smtClean="0"/>
+              <a:rPr lang="en-US"/>
               <a:t>Edit Master text styles</a:t>
             </a:r>
           </a:p>
           <a:p>
             <a:pPr lvl="1"/>
             <a:r>
-              <a:rPr lang="en-US" smtClean="0"/>
+              <a:rPr lang="en-US"/>
               <a:t>Second level</a:t>
             </a:r>
           </a:p>
           <a:p>
             <a:pPr lvl="2"/>
             <a:r>
-              <a:rPr lang="en-US" smtClean="0"/>
+              <a:rPr lang="en-US"/>
               <a:t>Third level</a:t>
             </a:r>
           </a:p>
           <a:p>
             <a:pPr lvl="3"/>
             <a:r>
-              <a:rPr lang="en-US" smtClean="0"/>
+              <a:rPr lang="en-US"/>
               <a:t>Fourth level</a:t>
             </a:r>
           </a:p>
           <a:p>
             <a:pPr lvl="4"/>
             <a:r>
-              <a:rPr lang="en-US" smtClean="0"/>
+              <a:rPr lang="en-US"/>
               <a:t>Fifth level</a:t>
             </a:r>
             <a:endParaRPr lang="en-US" dirty="0"/>
@@ -1126,7 +1133,7 @@
           <a:p>
             <a:fld id="{7CFA13FA-1D80-4FB4-8271-48F38922699E}" type="datetimeFigureOut">
               <a:rPr lang="en-ZA" smtClean="0"/>
-              <a:t>2021/07/05</a:t>
+              <a:t>2021/07/09</a:t>
             </a:fld>
             <a:endParaRPr lang="en-ZA"/>
           </a:p>
@@ -1537,7 +1544,7 @@
           </a:lstStyle>
           <a:p>
             <a:r>
-              <a:rPr lang="en-US" smtClean="0"/>
+              <a:rPr lang="en-US"/>
               <a:t>Click to edit Master title style</a:t>
             </a:r>
             <a:endParaRPr lang="en-US" dirty="0"/>
@@ -1658,7 +1665,7 @@
           <a:p>
             <a:pPr lvl="0"/>
             <a:r>
-              <a:rPr lang="en-US" smtClean="0"/>
+              <a:rPr lang="en-US"/>
               <a:t>Edit Master text styles</a:t>
             </a:r>
           </a:p>
@@ -1697,7 +1704,7 @@
           <a:p>
             <a:fld id="{7CFA13FA-1D80-4FB4-8271-48F38922699E}" type="datetimeFigureOut">
               <a:rPr lang="en-ZA" smtClean="0"/>
-              <a:t>2021/07/05</a:t>
+              <a:t>2021/07/09</a:t>
             </a:fld>
             <a:endParaRPr lang="en-ZA"/>
           </a:p>
@@ -1805,7 +1812,7 @@
           <a:lstStyle/>
           <a:p>
             <a:r>
-              <a:rPr lang="en-US" smtClean="0"/>
+              <a:rPr lang="en-US"/>
               <a:t>Click to edit Master title style</a:t>
             </a:r>
             <a:endParaRPr lang="en-US" dirty="0"/>
@@ -1862,35 +1869,35 @@
           <a:p>
             <a:pPr lvl="0"/>
             <a:r>
-              <a:rPr lang="en-US" smtClean="0"/>
+              <a:rPr lang="en-US"/>
               <a:t>Edit Master text styles</a:t>
             </a:r>
           </a:p>
           <a:p>
             <a:pPr lvl="1"/>
             <a:r>
-              <a:rPr lang="en-US" smtClean="0"/>
+              <a:rPr lang="en-US"/>
               <a:t>Second level</a:t>
             </a:r>
           </a:p>
           <a:p>
             <a:pPr lvl="2"/>
             <a:r>
-              <a:rPr lang="en-US" smtClean="0"/>
+              <a:rPr lang="en-US"/>
               <a:t>Third level</a:t>
             </a:r>
           </a:p>
           <a:p>
             <a:pPr lvl="3"/>
             <a:r>
-              <a:rPr lang="en-US" smtClean="0"/>
+              <a:rPr lang="en-US"/>
               <a:t>Fourth level</a:t>
             </a:r>
           </a:p>
           <a:p>
             <a:pPr lvl="4"/>
             <a:r>
-              <a:rPr lang="en-US" smtClean="0"/>
+              <a:rPr lang="en-US"/>
               <a:t>Fifth level</a:t>
             </a:r>
             <a:endParaRPr lang="en-US" dirty="0"/>
@@ -1947,35 +1954,35 @@
           <a:p>
             <a:pPr lvl="0"/>
             <a:r>
-              <a:rPr lang="en-US" smtClean="0"/>
+              <a:rPr lang="en-US"/>
               <a:t>Edit Master text styles</a:t>
             </a:r>
           </a:p>
           <a:p>
             <a:pPr lvl="1"/>
             <a:r>
-              <a:rPr lang="en-US" smtClean="0"/>
+              <a:rPr lang="en-US"/>
               <a:t>Second level</a:t>
             </a:r>
           </a:p>
           <a:p>
             <a:pPr lvl="2"/>
             <a:r>
-              <a:rPr lang="en-US" smtClean="0"/>
+              <a:rPr lang="en-US"/>
               <a:t>Third level</a:t>
             </a:r>
           </a:p>
           <a:p>
             <a:pPr lvl="3"/>
             <a:r>
-              <a:rPr lang="en-US" smtClean="0"/>
+              <a:rPr lang="en-US"/>
               <a:t>Fourth level</a:t>
             </a:r>
           </a:p>
           <a:p>
             <a:pPr lvl="4"/>
             <a:r>
-              <a:rPr lang="en-US" smtClean="0"/>
+              <a:rPr lang="en-US"/>
               <a:t>Fifth level</a:t>
             </a:r>
             <a:endParaRPr lang="en-US" dirty="0"/>
@@ -1999,7 +2006,7 @@
           <a:p>
             <a:fld id="{7CFA13FA-1D80-4FB4-8271-48F38922699E}" type="datetimeFigureOut">
               <a:rPr lang="en-ZA" smtClean="0"/>
-              <a:t>2021/07/05</a:t>
+              <a:t>2021/07/09</a:t>
             </a:fld>
             <a:endParaRPr lang="en-ZA"/>
           </a:p>
@@ -2093,7 +2100,7 @@
           <a:lstStyle/>
           <a:p>
             <a:r>
-              <a:rPr lang="en-US" smtClean="0"/>
+              <a:rPr lang="en-US"/>
               <a:t>Click to edit Master title style</a:t>
             </a:r>
             <a:endParaRPr lang="en-US" dirty="0"/>
@@ -2169,7 +2176,7 @@
           <a:p>
             <a:pPr lvl="0"/>
             <a:r>
-              <a:rPr lang="en-US" smtClean="0"/>
+              <a:rPr lang="en-US"/>
               <a:t>Edit Master text styles</a:t>
             </a:r>
           </a:p>
@@ -2225,35 +2232,35 @@
           <a:p>
             <a:pPr lvl="0"/>
             <a:r>
-              <a:rPr lang="en-US" smtClean="0"/>
+              <a:rPr lang="en-US"/>
               <a:t>Edit Master text styles</a:t>
             </a:r>
           </a:p>
           <a:p>
             <a:pPr lvl="1"/>
             <a:r>
-              <a:rPr lang="en-US" smtClean="0"/>
+              <a:rPr lang="en-US"/>
               <a:t>Second level</a:t>
             </a:r>
           </a:p>
           <a:p>
             <a:pPr lvl="2"/>
             <a:r>
-              <a:rPr lang="en-US" smtClean="0"/>
+              <a:rPr lang="en-US"/>
               <a:t>Third level</a:t>
             </a:r>
           </a:p>
           <a:p>
             <a:pPr lvl="3"/>
             <a:r>
-              <a:rPr lang="en-US" smtClean="0"/>
+              <a:rPr lang="en-US"/>
               <a:t>Fourth level</a:t>
             </a:r>
           </a:p>
           <a:p>
             <a:pPr lvl="4"/>
             <a:r>
-              <a:rPr lang="en-US" smtClean="0"/>
+              <a:rPr lang="en-US"/>
               <a:t>Fifth level</a:t>
             </a:r>
             <a:endParaRPr lang="en-US" dirty="0"/>
@@ -2328,7 +2335,7 @@
           <a:p>
             <a:pPr lvl="0"/>
             <a:r>
-              <a:rPr lang="en-US" smtClean="0"/>
+              <a:rPr lang="en-US"/>
               <a:t>Edit Master text styles</a:t>
             </a:r>
           </a:p>
@@ -2384,35 +2391,35 @@
           <a:p>
             <a:pPr lvl="0"/>
             <a:r>
-              <a:rPr lang="en-US" smtClean="0"/>
+              <a:rPr lang="en-US"/>
               <a:t>Edit Master text styles</a:t>
             </a:r>
           </a:p>
           <a:p>
             <a:pPr lvl="1"/>
             <a:r>
-              <a:rPr lang="en-US" smtClean="0"/>
+              <a:rPr lang="en-US"/>
               <a:t>Second level</a:t>
             </a:r>
           </a:p>
           <a:p>
             <a:pPr lvl="2"/>
             <a:r>
-              <a:rPr lang="en-US" smtClean="0"/>
+              <a:rPr lang="en-US"/>
               <a:t>Third level</a:t>
             </a:r>
           </a:p>
           <a:p>
             <a:pPr lvl="3"/>
             <a:r>
-              <a:rPr lang="en-US" smtClean="0"/>
+              <a:rPr lang="en-US"/>
               <a:t>Fourth level</a:t>
             </a:r>
           </a:p>
           <a:p>
             <a:pPr lvl="4"/>
             <a:r>
-              <a:rPr lang="en-US" smtClean="0"/>
+              <a:rPr lang="en-US"/>
               <a:t>Fifth level</a:t>
             </a:r>
             <a:endParaRPr lang="en-US" dirty="0"/>
@@ -2436,7 +2443,7 @@
           <a:p>
             <a:fld id="{7CFA13FA-1D80-4FB4-8271-48F38922699E}" type="datetimeFigureOut">
               <a:rPr lang="en-ZA" smtClean="0"/>
-              <a:t>2021/07/05</a:t>
+              <a:t>2021/07/09</a:t>
             </a:fld>
             <a:endParaRPr lang="en-ZA"/>
           </a:p>
@@ -2530,7 +2537,7 @@
           <a:lstStyle/>
           <a:p>
             <a:r>
-              <a:rPr lang="en-US" smtClean="0"/>
+              <a:rPr lang="en-US"/>
               <a:t>Click to edit Master title style</a:t>
             </a:r>
             <a:endParaRPr lang="en-US" dirty="0"/>
@@ -2554,7 +2561,7 @@
           <a:p>
             <a:fld id="{7CFA13FA-1D80-4FB4-8271-48F38922699E}" type="datetimeFigureOut">
               <a:rPr lang="en-ZA" smtClean="0"/>
-              <a:t>2021/07/05</a:t>
+              <a:t>2021/07/09</a:t>
             </a:fld>
             <a:endParaRPr lang="en-ZA"/>
           </a:p>
@@ -2649,7 +2656,7 @@
           <a:p>
             <a:fld id="{7CFA13FA-1D80-4FB4-8271-48F38922699E}" type="datetimeFigureOut">
               <a:rPr lang="en-ZA" smtClean="0"/>
-              <a:t>2021/07/05</a:t>
+              <a:t>2021/07/09</a:t>
             </a:fld>
             <a:endParaRPr lang="en-ZA"/>
           </a:p>
@@ -2845,7 +2852,7 @@
           </a:lstStyle>
           <a:p>
             <a:r>
-              <a:rPr lang="en-US" smtClean="0"/>
+              <a:rPr lang="en-US"/>
               <a:t>Click to edit Master title style</a:t>
             </a:r>
             <a:endParaRPr lang="en-US" dirty="0"/>
@@ -2902,35 +2909,35 @@
           <a:p>
             <a:pPr lvl="0"/>
             <a:r>
-              <a:rPr lang="en-US" smtClean="0"/>
+              <a:rPr lang="en-US"/>
               <a:t>Edit Master text styles</a:t>
             </a:r>
           </a:p>
           <a:p>
             <a:pPr lvl="1"/>
             <a:r>
-              <a:rPr lang="en-US" smtClean="0"/>
+              <a:rPr lang="en-US"/>
               <a:t>Second level</a:t>
             </a:r>
           </a:p>
           <a:p>
             <a:pPr lvl="2"/>
             <a:r>
-              <a:rPr lang="en-US" smtClean="0"/>
+              <a:rPr lang="en-US"/>
               <a:t>Third level</a:t>
             </a:r>
           </a:p>
           <a:p>
             <a:pPr lvl="3"/>
             <a:r>
-              <a:rPr lang="en-US" smtClean="0"/>
+              <a:rPr lang="en-US"/>
               <a:t>Fourth level</a:t>
             </a:r>
           </a:p>
           <a:p>
             <a:pPr lvl="4"/>
             <a:r>
-              <a:rPr lang="en-US" smtClean="0"/>
+              <a:rPr lang="en-US"/>
               <a:t>Fifth level</a:t>
             </a:r>
             <a:endParaRPr lang="en-US" dirty="0"/>
@@ -3008,7 +3015,7 @@
           <a:p>
             <a:pPr lvl="0"/>
             <a:r>
-              <a:rPr lang="en-US" smtClean="0"/>
+              <a:rPr lang="en-US"/>
               <a:t>Edit Master text styles</a:t>
             </a:r>
           </a:p>
@@ -3031,7 +3038,7 @@
           <a:p>
             <a:fld id="{7CFA13FA-1D80-4FB4-8271-48F38922699E}" type="datetimeFigureOut">
               <a:rPr lang="en-ZA" smtClean="0"/>
-              <a:t>2021/07/05</a:t>
+              <a:t>2021/07/09</a:t>
             </a:fld>
             <a:endParaRPr lang="en-ZA"/>
           </a:p>
@@ -3235,7 +3242,7 @@
           </a:lstStyle>
           <a:p>
             <a:r>
-              <a:rPr lang="en-US" smtClean="0"/>
+              <a:rPr lang="en-US"/>
               <a:t>Click to edit Master title style</a:t>
             </a:r>
             <a:endParaRPr lang="en-US" dirty="0"/>
@@ -3309,7 +3316,7 @@
           </a:lstStyle>
           <a:p>
             <a:r>
-              <a:rPr lang="en-US" smtClean="0"/>
+              <a:rPr lang="en-US"/>
               <a:t>Click icon to add picture</a:t>
             </a:r>
             <a:endParaRPr lang="en-US" dirty="0"/>
@@ -3387,7 +3394,7 @@
           <a:p>
             <a:pPr lvl="0"/>
             <a:r>
-              <a:rPr lang="en-US" smtClean="0"/>
+              <a:rPr lang="en-US"/>
               <a:t>Edit Master text styles</a:t>
             </a:r>
           </a:p>
@@ -3425,7 +3432,7 @@
           <a:p>
             <a:fld id="{7CFA13FA-1D80-4FB4-8271-48F38922699E}" type="datetimeFigureOut">
               <a:rPr lang="en-ZA" smtClean="0"/>
-              <a:t>2021/07/05</a:t>
+              <a:t>2021/07/09</a:t>
             </a:fld>
             <a:endParaRPr lang="en-ZA"/>
           </a:p>
@@ -3633,7 +3640,7 @@
           <a:lstStyle/>
           <a:p>
             <a:r>
-              <a:rPr lang="en-US" smtClean="0"/>
+              <a:rPr lang="en-US"/>
               <a:t>Click to edit Master title style</a:t>
             </a:r>
             <a:endParaRPr lang="en-US" dirty="0"/>
@@ -3667,35 +3674,35 @@
           <a:p>
             <a:pPr lvl="0"/>
             <a:r>
-              <a:rPr lang="en-US" smtClean="0"/>
+              <a:rPr lang="en-US"/>
               <a:t>Edit Master text styles</a:t>
             </a:r>
           </a:p>
           <a:p>
             <a:pPr lvl="1"/>
             <a:r>
-              <a:rPr lang="en-US" smtClean="0"/>
+              <a:rPr lang="en-US"/>
               <a:t>Second level</a:t>
             </a:r>
           </a:p>
           <a:p>
             <a:pPr lvl="2"/>
             <a:r>
-              <a:rPr lang="en-US" smtClean="0"/>
+              <a:rPr lang="en-US"/>
               <a:t>Third level</a:t>
             </a:r>
           </a:p>
           <a:p>
             <a:pPr lvl="3"/>
             <a:r>
-              <a:rPr lang="en-US" smtClean="0"/>
+              <a:rPr lang="en-US"/>
               <a:t>Fourth level</a:t>
             </a:r>
           </a:p>
           <a:p>
             <a:pPr lvl="4"/>
             <a:r>
-              <a:rPr lang="en-US" smtClean="0"/>
+              <a:rPr lang="en-US"/>
               <a:t>Fifth level</a:t>
             </a:r>
             <a:endParaRPr lang="en-US" dirty="0"/>
@@ -3738,7 +3745,7 @@
           <a:p>
             <a:fld id="{7CFA13FA-1D80-4FB4-8271-48F38922699E}" type="datetimeFigureOut">
               <a:rPr lang="en-ZA" smtClean="0"/>
-              <a:t>2021/07/05</a:t>
+              <a:t>2021/07/09</a:t>
             </a:fld>
             <a:endParaRPr lang="en-ZA"/>
           </a:p>
@@ -4216,16 +4223,20 @@
             <p:ph type="ctrTitle"/>
           </p:nvPr>
         </p:nvSpPr>
-        <p:spPr/>
+        <p:spPr>
+          <a:xfrm>
+            <a:off x="1561708" y="2091263"/>
+            <a:ext cx="9068586" cy="1337737"/>
+          </a:xfrm>
+        </p:spPr>
         <p:txBody>
           <a:bodyPr/>
           <a:lstStyle/>
           <a:p>
             <a:r>
-              <a:rPr lang="en-ZA" dirty="0" smtClean="0"/>
+              <a:rPr lang="en-ZA" dirty="0"/>
               <a:t>ML4EO Workshop</a:t>
             </a:r>
-            <a:endParaRPr lang="en-ZA" dirty="0"/>
           </a:p>
         </p:txBody>
       </p:sp>
@@ -4239,19 +4250,309 @@
             <p:ph type="subTitle" idx="1"/>
           </p:nvPr>
         </p:nvSpPr>
-        <p:spPr/>
+        <p:spPr>
+          <a:xfrm>
+            <a:off x="1561706" y="3200399"/>
+            <a:ext cx="9070848" cy="457201"/>
+          </a:xfrm>
+        </p:spPr>
         <p:txBody>
           <a:bodyPr/>
           <a:lstStyle/>
           <a:p>
             <a:r>
-              <a:rPr lang="en-ZA" dirty="0" smtClean="0"/>
+              <a:rPr lang="en-ZA" dirty="0"/>
+              <a:t>Machine Learning for Earth Observation</a:t>
+            </a:r>
+          </a:p>
+        </p:txBody>
+      </p:sp>
+      <p:sp>
+        <p:nvSpPr>
+          <p:cNvPr id="4" name="Subtitle 2">
+            <a:extLst>
+              <a:ext uri="{FF2B5EF4-FFF2-40B4-BE49-F238E27FC236}">
+                <a16:creationId xmlns:a16="http://schemas.microsoft.com/office/drawing/2014/main" id="{597A3207-FC02-435F-9724-DE9FE17398C2}"/>
+              </a:ext>
+            </a:extLst>
+          </p:cNvPr>
+          <p:cNvSpPr txBox="1">
+            <a:spLocks/>
+          </p:cNvSpPr>
+          <p:nvPr/>
+        </p:nvSpPr>
+        <p:spPr>
+          <a:xfrm>
+            <a:off x="1559446" y="3583244"/>
+            <a:ext cx="9070848" cy="457201"/>
+          </a:xfrm>
+          <a:prstGeom prst="rect">
+            <a:avLst/>
+          </a:prstGeom>
+        </p:spPr>
+        <p:txBody>
+          <a:bodyPr vert="horz" lIns="91440" tIns="45720" rIns="91440" bIns="45720" rtlCol="0">
+            <a:normAutofit/>
+          </a:bodyPr>
+          <a:lstStyle>
+            <a:lvl1pPr marL="0" indent="0" algn="ctr" defTabSz="914400" rtl="0" eaLnBrk="1" latinLnBrk="0" hangingPunct="1">
+              <a:lnSpc>
+                <a:spcPct val="100000"/>
+              </a:lnSpc>
+              <a:spcBef>
+                <a:spcPts val="0"/>
+              </a:spcBef>
+              <a:spcAft>
+                <a:spcPts val="0"/>
+              </a:spcAft>
+              <a:buClr>
+                <a:schemeClr val="tx1">
+                  <a:lumMod val="85000"/>
+                  <a:lumOff val="15000"/>
+                </a:schemeClr>
+              </a:buClr>
+              <a:buFont typeface="Garamond" pitchFamily="18" charset="0"/>
+              <a:buNone/>
+              <a:defRPr sz="1600" kern="1200" spc="80" baseline="0">
+                <a:solidFill>
+                  <a:schemeClr val="tx1"/>
+                </a:solidFill>
+                <a:latin typeface="+mn-lt"/>
+                <a:ea typeface="+mn-ea"/>
+                <a:cs typeface="+mn-cs"/>
+              </a:defRPr>
+            </a:lvl1pPr>
+            <a:lvl2pPr marL="457200" indent="0" algn="ctr" defTabSz="914400" rtl="0" eaLnBrk="1" latinLnBrk="0" hangingPunct="1">
+              <a:lnSpc>
+                <a:spcPct val="100000"/>
+              </a:lnSpc>
+              <a:spcBef>
+                <a:spcPts val="500"/>
+              </a:spcBef>
+              <a:buClr>
+                <a:schemeClr val="tx1">
+                  <a:lumMod val="85000"/>
+                  <a:lumOff val="15000"/>
+                </a:schemeClr>
+              </a:buClr>
+              <a:buFont typeface="Garamond" pitchFamily="18" charset="0"/>
+              <a:buNone/>
+              <a:defRPr sz="1600" kern="1200">
+                <a:solidFill>
+                  <a:schemeClr val="tx1"/>
+                </a:solidFill>
+                <a:latin typeface="+mn-lt"/>
+                <a:ea typeface="+mn-ea"/>
+                <a:cs typeface="+mn-cs"/>
+              </a:defRPr>
+            </a:lvl2pPr>
+            <a:lvl3pPr marL="914400" indent="0" algn="ctr" defTabSz="914400" rtl="0" eaLnBrk="1" latinLnBrk="0" hangingPunct="1">
+              <a:lnSpc>
+                <a:spcPct val="100000"/>
+              </a:lnSpc>
+              <a:spcBef>
+                <a:spcPts val="500"/>
+              </a:spcBef>
+              <a:buClr>
+                <a:schemeClr val="tx1">
+                  <a:lumMod val="85000"/>
+                  <a:lumOff val="15000"/>
+                </a:schemeClr>
+              </a:buClr>
+              <a:buFont typeface="Garamond" pitchFamily="18" charset="0"/>
+              <a:buNone/>
+              <a:defRPr sz="1600" kern="1200">
+                <a:solidFill>
+                  <a:schemeClr val="tx1"/>
+                </a:solidFill>
+                <a:latin typeface="+mn-lt"/>
+                <a:ea typeface="+mn-ea"/>
+                <a:cs typeface="+mn-cs"/>
+              </a:defRPr>
+            </a:lvl3pPr>
+            <a:lvl4pPr marL="1371600" indent="0" algn="ctr" defTabSz="914400" rtl="0" eaLnBrk="1" latinLnBrk="0" hangingPunct="1">
+              <a:lnSpc>
+                <a:spcPct val="100000"/>
+              </a:lnSpc>
+              <a:spcBef>
+                <a:spcPts val="500"/>
+              </a:spcBef>
+              <a:buClr>
+                <a:schemeClr val="tx1">
+                  <a:lumMod val="85000"/>
+                  <a:lumOff val="15000"/>
+                </a:schemeClr>
+              </a:buClr>
+              <a:buFont typeface="Garamond" pitchFamily="18" charset="0"/>
+              <a:buNone/>
+              <a:defRPr sz="1600" kern="1200">
+                <a:solidFill>
+                  <a:schemeClr val="tx1"/>
+                </a:solidFill>
+                <a:latin typeface="+mn-lt"/>
+                <a:ea typeface="+mn-ea"/>
+                <a:cs typeface="+mn-cs"/>
+              </a:defRPr>
+            </a:lvl4pPr>
+            <a:lvl5pPr marL="1828800" indent="0" algn="ctr" defTabSz="914400" rtl="0" eaLnBrk="1" latinLnBrk="0" hangingPunct="1">
+              <a:lnSpc>
+                <a:spcPct val="100000"/>
+              </a:lnSpc>
+              <a:spcBef>
+                <a:spcPts val="500"/>
+              </a:spcBef>
+              <a:buClr>
+                <a:schemeClr val="tx1">
+                  <a:lumMod val="85000"/>
+                  <a:lumOff val="15000"/>
+                </a:schemeClr>
+              </a:buClr>
+              <a:buFont typeface="Garamond" pitchFamily="18" charset="0"/>
+              <a:buNone/>
+              <a:defRPr sz="1600" kern="1200">
+                <a:solidFill>
+                  <a:schemeClr val="tx1"/>
+                </a:solidFill>
+                <a:latin typeface="+mn-lt"/>
+                <a:ea typeface="+mn-ea"/>
+                <a:cs typeface="+mn-cs"/>
+              </a:defRPr>
+            </a:lvl5pPr>
+            <a:lvl6pPr marL="2286000" indent="0" algn="ctr" defTabSz="914400" rtl="0" eaLnBrk="1" latinLnBrk="0" hangingPunct="1">
+              <a:lnSpc>
+                <a:spcPct val="100000"/>
+              </a:lnSpc>
+              <a:spcBef>
+                <a:spcPts val="500"/>
+              </a:spcBef>
+              <a:buClr>
+                <a:schemeClr val="tx1">
+                  <a:lumMod val="85000"/>
+                  <a:lumOff val="15000"/>
+                </a:schemeClr>
+              </a:buClr>
+              <a:buFont typeface="Garamond" pitchFamily="18" charset="0"/>
+              <a:buNone/>
+              <a:defRPr sz="1600" kern="1200">
+                <a:solidFill>
+                  <a:schemeClr val="tx1"/>
+                </a:solidFill>
+                <a:latin typeface="+mn-lt"/>
+                <a:ea typeface="+mn-ea"/>
+                <a:cs typeface="+mn-cs"/>
+              </a:defRPr>
+            </a:lvl6pPr>
+            <a:lvl7pPr marL="2743200" indent="0" algn="ctr" defTabSz="914400" rtl="0" eaLnBrk="1" latinLnBrk="0" hangingPunct="1">
+              <a:lnSpc>
+                <a:spcPct val="100000"/>
+              </a:lnSpc>
+              <a:spcBef>
+                <a:spcPts val="500"/>
+              </a:spcBef>
+              <a:buClr>
+                <a:schemeClr val="tx1">
+                  <a:lumMod val="85000"/>
+                  <a:lumOff val="15000"/>
+                </a:schemeClr>
+              </a:buClr>
+              <a:buFont typeface="Garamond" pitchFamily="18" charset="0"/>
+              <a:buNone/>
+              <a:defRPr sz="1600" kern="1200">
+                <a:solidFill>
+                  <a:schemeClr val="tx1"/>
+                </a:solidFill>
+                <a:latin typeface="+mn-lt"/>
+                <a:ea typeface="+mn-ea"/>
+                <a:cs typeface="+mn-cs"/>
+              </a:defRPr>
+            </a:lvl7pPr>
+            <a:lvl8pPr marL="3200400" indent="0" algn="ctr" defTabSz="914400" rtl="0" eaLnBrk="1" latinLnBrk="0" hangingPunct="1">
+              <a:lnSpc>
+                <a:spcPct val="100000"/>
+              </a:lnSpc>
+              <a:spcBef>
+                <a:spcPts val="500"/>
+              </a:spcBef>
+              <a:buClr>
+                <a:schemeClr val="tx1">
+                  <a:lumMod val="85000"/>
+                  <a:lumOff val="15000"/>
+                </a:schemeClr>
+              </a:buClr>
+              <a:buFont typeface="Garamond" pitchFamily="18" charset="0"/>
+              <a:buNone/>
+              <a:defRPr sz="1600" kern="1200">
+                <a:solidFill>
+                  <a:schemeClr val="tx1"/>
+                </a:solidFill>
+                <a:latin typeface="+mn-lt"/>
+                <a:ea typeface="+mn-ea"/>
+                <a:cs typeface="+mn-cs"/>
+              </a:defRPr>
+            </a:lvl8pPr>
+            <a:lvl9pPr marL="3657600" indent="0" algn="ctr" defTabSz="914400" rtl="0" eaLnBrk="1" latinLnBrk="0" hangingPunct="1">
+              <a:lnSpc>
+                <a:spcPct val="100000"/>
+              </a:lnSpc>
+              <a:spcBef>
+                <a:spcPts val="500"/>
+              </a:spcBef>
+              <a:buClr>
+                <a:schemeClr val="tx1">
+                  <a:lumMod val="85000"/>
+                  <a:lumOff val="15000"/>
+                </a:schemeClr>
+              </a:buClr>
+              <a:buFont typeface="Garamond" pitchFamily="18" charset="0"/>
+              <a:buNone/>
+              <a:defRPr sz="1600" kern="1200">
+                <a:solidFill>
+                  <a:schemeClr val="tx1"/>
+                </a:solidFill>
+                <a:latin typeface="+mn-lt"/>
+                <a:ea typeface="+mn-ea"/>
+                <a:cs typeface="+mn-cs"/>
+              </a:defRPr>
+            </a:lvl9pPr>
+          </a:lstStyle>
+          <a:p>
+            <a:r>
+              <a:rPr lang="en-ZA" dirty="0"/>
               <a:t>9,16,23, and 30 July 2021</a:t>
             </a:r>
-            <a:endParaRPr lang="en-ZA" dirty="0"/>
-          </a:p>
-        </p:txBody>
-      </p:sp>
+          </a:p>
+        </p:txBody>
+      </p:sp>
+      <p:pic>
+        <p:nvPicPr>
+          <p:cNvPr id="6" name="Picture 5">
+            <a:extLst>
+              <a:ext uri="{FF2B5EF4-FFF2-40B4-BE49-F238E27FC236}">
+                <a16:creationId xmlns:a16="http://schemas.microsoft.com/office/drawing/2014/main" id="{5F1BCCFE-FDE1-47DB-9CBF-EC687B1942D4}"/>
+              </a:ext>
+            </a:extLst>
+          </p:cNvPr>
+          <p:cNvPicPr>
+            <a:picLocks noChangeAspect="1"/>
+          </p:cNvPicPr>
+          <p:nvPr/>
+        </p:nvPicPr>
+        <p:blipFill>
+          <a:blip r:embed="rId2"/>
+          <a:stretch>
+            <a:fillRect/>
+          </a:stretch>
+        </p:blipFill>
+        <p:spPr>
+          <a:xfrm>
+            <a:off x="3864578" y="4040445"/>
+            <a:ext cx="4460584" cy="1391172"/>
+          </a:xfrm>
+          <a:prstGeom prst="rect">
+            <a:avLst/>
+          </a:prstGeom>
+        </p:spPr>
+      </p:pic>
     </p:spTree>
     <p:extLst>
       <p:ext uri="{BB962C8B-B14F-4D97-AF65-F5344CB8AC3E}">
@@ -4298,10 +4599,9 @@
           <a:lstStyle/>
           <a:p>
             <a:r>
-              <a:rPr lang="en-ZA" dirty="0" smtClean="0"/>
-              <a:t>Overview</a:t>
-            </a:r>
-            <a:endParaRPr lang="en-ZA" dirty="0"/>
+              <a:rPr lang="en-ZA" dirty="0"/>
+              <a:t>What is it?</a:t>
+            </a:r>
           </a:p>
         </p:txBody>
       </p:sp>
@@ -4321,31 +4621,133 @@
           <a:lstStyle/>
           <a:p>
             <a:r>
-              <a:rPr lang="en-ZA" dirty="0" smtClean="0"/>
+              <a:rPr lang="en-ZA" dirty="0"/>
+              <a:t>ML4EO: Machine Learning for Earth Observation</a:t>
+            </a:r>
+          </a:p>
+          <a:p>
+            <a:r>
+              <a:rPr lang="en-ZA" dirty="0"/>
+              <a:t>Training of trainers workshop developed by Radiant Earth: </a:t>
+            </a:r>
+            <a:r>
+              <a:rPr lang="en-ZA" dirty="0">
+                <a:hlinkClick r:id="rId2"/>
+              </a:rPr>
+              <a:t>https://www.radiant.earth</a:t>
+            </a:r>
+            <a:endParaRPr lang="en-ZA" dirty="0"/>
+          </a:p>
+          <a:p>
+            <a:r>
+              <a:rPr lang="en-ZA" dirty="0"/>
+              <a:t>Capacity development in Africa</a:t>
+            </a:r>
+          </a:p>
+          <a:p>
+            <a:r>
+              <a:rPr lang="en-ZA" dirty="0"/>
               <a:t>10 individual lectures</a:t>
             </a:r>
           </a:p>
           <a:p>
             <a:r>
-              <a:rPr lang="en-ZA" dirty="0" smtClean="0"/>
-              <a:t>We will cover the work in 4 lectures of 3 hours each.</a:t>
-            </a:r>
-          </a:p>
-          <a:p>
-            <a:r>
-              <a:rPr lang="en-ZA" dirty="0" smtClean="0"/>
+              <a:rPr lang="en-ZA" dirty="0"/>
+              <a:t>We will cover the work in 4 days of 3 hours each.</a:t>
+            </a:r>
+          </a:p>
+          <a:p>
+            <a:r>
+              <a:rPr lang="en-ZA" dirty="0"/>
               <a:t>Different backgrounds of attendees – some of the information will be very familiar to some of you, some will be new.</a:t>
             </a:r>
           </a:p>
           <a:p>
             <a:r>
-              <a:rPr lang="en-ZA" dirty="0" smtClean="0"/>
+              <a:rPr lang="en-ZA" dirty="0"/>
               <a:t>At the end of the workshop: e-mail ML4EO organisers confirming that you were trained. (This ensures I get my training-of-trainers certificate!)</a:t>
             </a:r>
+          </a:p>
+          <a:p>
+            <a:pPr marL="0" indent="0">
+              <a:buNone/>
+            </a:pPr>
             <a:endParaRPr lang="en-ZA" dirty="0"/>
           </a:p>
         </p:txBody>
       </p:sp>
+      <p:pic>
+        <p:nvPicPr>
+          <p:cNvPr id="5" name="Picture 4">
+            <a:extLst>
+              <a:ext uri="{FF2B5EF4-FFF2-40B4-BE49-F238E27FC236}">
+                <a16:creationId xmlns:a16="http://schemas.microsoft.com/office/drawing/2014/main" id="{A0BB90ED-0FEA-44FC-B141-CDDDBC4BDA0A}"/>
+              </a:ext>
+            </a:extLst>
+          </p:cNvPr>
+          <p:cNvPicPr>
+            <a:picLocks noChangeAspect="1"/>
+          </p:cNvPicPr>
+          <p:nvPr/>
+        </p:nvPicPr>
+        <p:blipFill>
+          <a:blip r:embed="rId3">
+            <a:extLst>
+              <a:ext uri="{28A0092B-C50C-407E-A947-70E740481C1C}">
+                <a14:useLocalDpi xmlns:a14="http://schemas.microsoft.com/office/drawing/2010/main" val="0"/>
+              </a:ext>
+            </a:extLst>
+          </a:blip>
+          <a:stretch>
+            <a:fillRect/>
+          </a:stretch>
+        </p:blipFill>
+        <p:spPr>
+          <a:xfrm>
+            <a:off x="9187956" y="282333"/>
+            <a:ext cx="2717040" cy="2092121"/>
+          </a:xfrm>
+          <a:prstGeom prst="rect">
+            <a:avLst/>
+          </a:prstGeom>
+        </p:spPr>
+      </p:pic>
+      <p:pic>
+        <p:nvPicPr>
+          <p:cNvPr id="7" name="Picture 6">
+            <a:extLst>
+              <a:ext uri="{FF2B5EF4-FFF2-40B4-BE49-F238E27FC236}">
+                <a16:creationId xmlns:a16="http://schemas.microsoft.com/office/drawing/2014/main" id="{4131E20A-5E5D-4F61-BCFD-6BF98C50BDA8}"/>
+              </a:ext>
+            </a:extLst>
+          </p:cNvPr>
+          <p:cNvPicPr>
+            <a:picLocks noChangeAspect="1"/>
+          </p:cNvPicPr>
+          <p:nvPr/>
+        </p:nvPicPr>
+        <p:blipFill>
+          <a:blip r:embed="rId4">
+            <a:extLst>
+              <a:ext uri="{28A0092B-C50C-407E-A947-70E740481C1C}">
+                <a14:useLocalDpi xmlns:a14="http://schemas.microsoft.com/office/drawing/2010/main" val="0"/>
+              </a:ext>
+            </a:extLst>
+          </a:blip>
+          <a:stretch>
+            <a:fillRect/>
+          </a:stretch>
+        </p:blipFill>
+        <p:spPr>
+          <a:xfrm>
+            <a:off x="5384946" y="282333"/>
+            <a:ext cx="3358393" cy="1679197"/>
+          </a:xfrm>
+          <a:prstGeom prst="rect">
+            <a:avLst/>
+          </a:prstGeom>
+        </p:spPr>
+      </p:pic>
     </p:spTree>
     <p:extLst>
       <p:ext uri="{BB962C8B-B14F-4D97-AF65-F5344CB8AC3E}">
@@ -4392,81 +4794,355 @@
           <a:lstStyle/>
           <a:p>
             <a:r>
-              <a:rPr lang="en-ZA" dirty="0" smtClean="0"/>
-              <a:t>Overview</a:t>
-            </a:r>
+              <a:rPr lang="en-ZA" dirty="0"/>
+              <a:t>Who am I?</a:t>
+            </a:r>
+          </a:p>
+        </p:txBody>
+      </p:sp>
+      <p:sp>
+        <p:nvSpPr>
+          <p:cNvPr id="3" name="Content Placeholder 2"/>
+          <p:cNvSpPr>
+            <a:spLocks noGrp="1"/>
+          </p:cNvSpPr>
+          <p:nvPr>
+            <p:ph idx="1"/>
+          </p:nvPr>
+        </p:nvSpPr>
+        <p:spPr>
+          <a:xfrm>
+            <a:off x="1066800" y="2103120"/>
+            <a:ext cx="10058400" cy="2049738"/>
+          </a:xfrm>
+        </p:spPr>
+        <p:txBody>
+          <a:bodyPr>
+            <a:normAutofit/>
+          </a:bodyPr>
+          <a:lstStyle/>
+          <a:p>
+            <a:r>
+              <a:rPr lang="en-ZA" dirty="0"/>
+              <a:t>Renate Thiede</a:t>
+            </a:r>
+          </a:p>
+          <a:p>
+            <a:r>
+              <a:rPr lang="en-ZA" dirty="0"/>
+              <a:t>PhD student &amp; part-time lecturer at UP Statistics Department</a:t>
+            </a:r>
+          </a:p>
+          <a:p>
+            <a:r>
+              <a:rPr lang="en-ZA" dirty="0"/>
+              <a:t>Research in spatial statistics with application to human mobility</a:t>
+            </a:r>
+          </a:p>
+          <a:p>
+            <a:r>
+              <a:rPr lang="en-ZA" dirty="0"/>
+              <a:t>Lecture undergrads and co-supervise postgrad students</a:t>
+            </a:r>
+          </a:p>
+          <a:p>
+            <a:r>
+              <a:rPr lang="en-ZA" dirty="0"/>
+              <a:t>Obligatory interesting fact: I write adventure stories in my spare time</a:t>
+            </a:r>
+          </a:p>
+          <a:p>
             <a:endParaRPr lang="en-ZA" dirty="0"/>
           </a:p>
-        </p:txBody>
-      </p:sp>
-      <p:sp>
-        <p:nvSpPr>
-          <p:cNvPr id="3" name="Content Placeholder 2"/>
-          <p:cNvSpPr>
-            <a:spLocks noGrp="1"/>
-          </p:cNvSpPr>
-          <p:nvPr>
-            <p:ph idx="1"/>
-          </p:nvPr>
-        </p:nvSpPr>
-        <p:spPr/>
-        <p:txBody>
-          <a:bodyPr/>
+          <a:p>
+            <a:endParaRPr lang="en-ZA" dirty="0"/>
+          </a:p>
+          <a:p>
+            <a:endParaRPr lang="en-ZA" dirty="0"/>
+          </a:p>
+        </p:txBody>
+      </p:sp>
+      <p:pic>
+        <p:nvPicPr>
+          <p:cNvPr id="7" name="Picture 6">
+            <a:extLst>
+              <a:ext uri="{FF2B5EF4-FFF2-40B4-BE49-F238E27FC236}">
+                <a16:creationId xmlns:a16="http://schemas.microsoft.com/office/drawing/2014/main" id="{C1182E20-DE83-4EA8-8EC0-3FF66103052B}"/>
+              </a:ext>
+            </a:extLst>
+          </p:cNvPr>
+          <p:cNvPicPr>
+            <a:picLocks noChangeAspect="1"/>
+          </p:cNvPicPr>
+          <p:nvPr/>
+        </p:nvPicPr>
+        <p:blipFill>
+          <a:blip r:embed="rId2" cstate="print">
+            <a:extLst>
+              <a:ext uri="{28A0092B-C50C-407E-A947-70E740481C1C}">
+                <a14:useLocalDpi xmlns:a14="http://schemas.microsoft.com/office/drawing/2010/main" val="0"/>
+              </a:ext>
+            </a:extLst>
+          </a:blip>
+          <a:stretch>
+            <a:fillRect/>
+          </a:stretch>
+        </p:blipFill>
+        <p:spPr>
+          <a:xfrm>
+            <a:off x="8974649" y="427838"/>
+            <a:ext cx="2782290" cy="2768367"/>
+          </a:xfrm>
+          <a:prstGeom prst="rect">
+            <a:avLst/>
+          </a:prstGeom>
+        </p:spPr>
+      </p:pic>
+      <p:sp>
+        <p:nvSpPr>
+          <p:cNvPr id="8" name="TextBox 7">
+            <a:extLst>
+              <a:ext uri="{FF2B5EF4-FFF2-40B4-BE49-F238E27FC236}">
+                <a16:creationId xmlns:a16="http://schemas.microsoft.com/office/drawing/2014/main" id="{8B85C041-62CF-4D26-A499-545A860C6554}"/>
+              </a:ext>
+            </a:extLst>
+          </p:cNvPr>
+          <p:cNvSpPr txBox="1"/>
+          <p:nvPr/>
+        </p:nvSpPr>
+        <p:spPr>
+          <a:xfrm>
+            <a:off x="9271348" y="3268035"/>
+            <a:ext cx="2604565" cy="2031325"/>
+          </a:xfrm>
+          <a:prstGeom prst="rect">
+            <a:avLst/>
+          </a:prstGeom>
+          <a:noFill/>
+        </p:spPr>
+        <p:txBody>
+          <a:bodyPr wrap="square" rtlCol="0">
+            <a:spAutoFit/>
+          </a:bodyPr>
           <a:lstStyle/>
           <a:p>
-            <a:r>
-              <a:rPr lang="en-ZA" dirty="0" smtClean="0"/>
-              <a:t>All materials available on GitHub: </a:t>
+            <a:pPr algn="r"/>
+            <a:r>
+              <a:rPr lang="en-ZA" dirty="0"/>
+              <a:t>LinkedIn: </a:t>
             </a:r>
             <a:r>
               <a:rPr lang="en-ZA" dirty="0">
-                <a:hlinkClick r:id="rId2"/>
+                <a:hlinkClick r:id="rId3"/>
               </a:rPr>
-              <a:t>https://</a:t>
-            </a:r>
-            <a:r>
-              <a:rPr lang="en-ZA" dirty="0" smtClean="0">
-                <a:hlinkClick r:id="rId2"/>
-              </a:rPr>
-              <a:t>github.com/RadiantMLHub/ml4eo-bootcamp-2021</a:t>
-            </a:r>
-            <a:endParaRPr lang="en-ZA" dirty="0" smtClean="0"/>
-          </a:p>
-          <a:p>
-            <a:r>
-              <a:rPr lang="en-ZA" dirty="0"/>
-              <a:t>You are welcome to clone the repository and work </a:t>
-            </a:r>
-            <a:r>
-              <a:rPr lang="en-ZA" dirty="0" smtClean="0"/>
-              <a:t>locally, especially if you are comfortable with GitHub and Python.</a:t>
-            </a:r>
-          </a:p>
-          <a:p>
-            <a:r>
-              <a:rPr lang="en-ZA" dirty="0" smtClean="0"/>
-              <a:t>You will need Python 3.8 – see the readme in GitHub for dependencies.</a:t>
+              <a:t>https://www.linkedin.com/in/renate-thiede/</a:t>
             </a:r>
             <a:endParaRPr lang="en-ZA" dirty="0"/>
           </a:p>
           <a:p>
-            <a:r>
-              <a:rPr lang="en-ZA" dirty="0" smtClean="0"/>
-              <a:t>Most of the work is available in Bindr or Google Colab.</a:t>
-            </a:r>
-          </a:p>
-          <a:p>
-            <a:r>
-              <a:rPr lang="en-ZA" dirty="0" smtClean="0"/>
-              <a:t>I will be running the programs in the cloud, as provided by the workshop organisers, to minimise issues with Python installation.</a:t>
-            </a:r>
-          </a:p>
-        </p:txBody>
-      </p:sp>
+            <a:pPr algn="r"/>
+            <a:r>
+              <a:rPr lang="en-ZA" dirty="0"/>
+              <a:t>Twitter: @RenateThiede</a:t>
+            </a:r>
+          </a:p>
+          <a:p>
+            <a:endParaRPr lang="en-ZA" dirty="0"/>
+          </a:p>
+        </p:txBody>
+      </p:sp>
+      <p:pic>
+        <p:nvPicPr>
+          <p:cNvPr id="1028" name="Picture 4" descr="Royalty-free book photos free download | Pxfuel">
+            <a:extLst>
+              <a:ext uri="{FF2B5EF4-FFF2-40B4-BE49-F238E27FC236}">
+                <a16:creationId xmlns:a16="http://schemas.microsoft.com/office/drawing/2014/main" id="{0EB089E2-6713-41DD-A2D4-FBC8AC617C86}"/>
+              </a:ext>
+            </a:extLst>
+          </p:cNvPr>
+          <p:cNvPicPr>
+            <a:picLocks noChangeAspect="1" noChangeArrowheads="1"/>
+          </p:cNvPicPr>
+          <p:nvPr/>
+        </p:nvPicPr>
+        <p:blipFill>
+          <a:blip r:embed="rId4" cstate="print">
+            <a:extLst>
+              <a:ext uri="{28A0092B-C50C-407E-A947-70E740481C1C}">
+                <a14:useLocalDpi xmlns:a14="http://schemas.microsoft.com/office/drawing/2010/main" val="0"/>
+              </a:ext>
+            </a:extLst>
+          </a:blip>
+          <a:srcRect/>
+          <a:stretch>
+            <a:fillRect/>
+          </a:stretch>
+        </p:blipFill>
+        <p:spPr bwMode="auto">
+          <a:xfrm>
+            <a:off x="4257631" y="4234650"/>
+            <a:ext cx="2604564" cy="1711571"/>
+          </a:xfrm>
+          <a:prstGeom prst="rect">
+            <a:avLst/>
+          </a:prstGeom>
+          <a:noFill/>
+          <a:extLst>
+            <a:ext uri="{909E8E84-426E-40DD-AFC4-6F175D3DCCD1}">
+              <a14:hiddenFill xmlns:a14="http://schemas.microsoft.com/office/drawing/2010/main">
+                <a:solidFill>
+                  <a:srgbClr val="FFFFFF"/>
+                </a:solidFill>
+              </a14:hiddenFill>
+            </a:ext>
+          </a:extLst>
+        </p:spPr>
+      </p:pic>
+      <p:pic>
+        <p:nvPicPr>
+          <p:cNvPr id="1030" name="Picture 6">
+            <a:extLst>
+              <a:ext uri="{FF2B5EF4-FFF2-40B4-BE49-F238E27FC236}">
+                <a16:creationId xmlns:a16="http://schemas.microsoft.com/office/drawing/2014/main" id="{E910AC5B-FD87-4710-B055-712C72A50194}"/>
+              </a:ext>
+            </a:extLst>
+          </p:cNvPr>
+          <p:cNvPicPr>
+            <a:picLocks noChangeAspect="1" noChangeArrowheads="1"/>
+          </p:cNvPicPr>
+          <p:nvPr/>
+        </p:nvPicPr>
+        <p:blipFill>
+          <a:blip r:embed="rId5" cstate="print">
+            <a:extLst>
+              <a:ext uri="{28A0092B-C50C-407E-A947-70E740481C1C}">
+                <a14:useLocalDpi xmlns:a14="http://schemas.microsoft.com/office/drawing/2010/main" val="0"/>
+              </a:ext>
+            </a:extLst>
+          </a:blip>
+          <a:srcRect/>
+          <a:stretch>
+            <a:fillRect/>
+          </a:stretch>
+        </p:blipFill>
+        <p:spPr bwMode="auto">
+          <a:xfrm>
+            <a:off x="5057208" y="453003"/>
+            <a:ext cx="2633063" cy="1750782"/>
+          </a:xfrm>
+          <a:prstGeom prst="rect">
+            <a:avLst/>
+          </a:prstGeom>
+          <a:noFill/>
+          <a:extLst>
+            <a:ext uri="{909E8E84-426E-40DD-AFC4-6F175D3DCCD1}">
+              <a14:hiddenFill xmlns:a14="http://schemas.microsoft.com/office/drawing/2010/main">
+                <a:solidFill>
+                  <a:srgbClr val="FFFFFF"/>
+                </a:solidFill>
+              </a14:hiddenFill>
+            </a:ext>
+          </a:extLst>
+        </p:spPr>
+      </p:pic>
+      <p:pic>
+        <p:nvPicPr>
+          <p:cNvPr id="1034" name="Picture 10" descr="African Sunset Nature - Free photo on Pixabay">
+            <a:extLst>
+              <a:ext uri="{FF2B5EF4-FFF2-40B4-BE49-F238E27FC236}">
+                <a16:creationId xmlns:a16="http://schemas.microsoft.com/office/drawing/2014/main" id="{B4CE233C-85D1-4511-B2D9-E3A55A514980}"/>
+              </a:ext>
+            </a:extLst>
+          </p:cNvPr>
+          <p:cNvPicPr>
+            <a:picLocks noChangeAspect="1" noChangeArrowheads="1"/>
+          </p:cNvPicPr>
+          <p:nvPr/>
+        </p:nvPicPr>
+        <p:blipFill>
+          <a:blip r:embed="rId6" cstate="print">
+            <a:extLst>
+              <a:ext uri="{28A0092B-C50C-407E-A947-70E740481C1C}">
+                <a14:useLocalDpi xmlns:a14="http://schemas.microsoft.com/office/drawing/2010/main" val="0"/>
+              </a:ext>
+            </a:extLst>
+          </a:blip>
+          <a:srcRect/>
+          <a:stretch>
+            <a:fillRect/>
+          </a:stretch>
+        </p:blipFill>
+        <p:spPr bwMode="auto">
+          <a:xfrm>
+            <a:off x="1293275" y="4143374"/>
+            <a:ext cx="2842497" cy="1894121"/>
+          </a:xfrm>
+          <a:prstGeom prst="rect">
+            <a:avLst/>
+          </a:prstGeom>
+          <a:noFill/>
+          <a:extLst>
+            <a:ext uri="{909E8E84-426E-40DD-AFC4-6F175D3DCCD1}">
+              <a14:hiddenFill xmlns:a14="http://schemas.microsoft.com/office/drawing/2010/main">
+                <a:solidFill>
+                  <a:srgbClr val="FFFFFF"/>
+                </a:solidFill>
+              </a14:hiddenFill>
+            </a:ext>
+          </a:extLst>
+        </p:spPr>
+      </p:pic>
+      <p:pic>
+        <p:nvPicPr>
+          <p:cNvPr id="1036" name="Picture 12" descr="Special forces - Wikipedia">
+            <a:extLst>
+              <a:ext uri="{FF2B5EF4-FFF2-40B4-BE49-F238E27FC236}">
+                <a16:creationId xmlns:a16="http://schemas.microsoft.com/office/drawing/2014/main" id="{410487CF-B72C-4BA5-AA61-34E219308BA0}"/>
+              </a:ext>
+            </a:extLst>
+          </p:cNvPr>
+          <p:cNvPicPr>
+            <a:picLocks noChangeAspect="1" noChangeArrowheads="1"/>
+          </p:cNvPicPr>
+          <p:nvPr/>
+        </p:nvPicPr>
+        <p:blipFill>
+          <a:blip r:embed="rId7" cstate="print">
+            <a:extLst>
+              <a:ext uri="{28A0092B-C50C-407E-A947-70E740481C1C}">
+                <a14:useLocalDpi xmlns:a14="http://schemas.microsoft.com/office/drawing/2010/main" val="0"/>
+              </a:ext>
+            </a:extLst>
+          </a:blip>
+          <a:srcRect/>
+          <a:stretch>
+            <a:fillRect/>
+          </a:stretch>
+        </p:blipFill>
+        <p:spPr bwMode="auto">
+          <a:xfrm>
+            <a:off x="6984054" y="4234650"/>
+            <a:ext cx="2604564" cy="1736108"/>
+          </a:xfrm>
+          <a:prstGeom prst="rect">
+            <a:avLst/>
+          </a:prstGeom>
+          <a:noFill/>
+          <a:extLst>
+            <a:ext uri="{909E8E84-426E-40DD-AFC4-6F175D3DCCD1}">
+              <a14:hiddenFill xmlns:a14="http://schemas.microsoft.com/office/drawing/2010/main">
+                <a:solidFill>
+                  <a:srgbClr val="FFFFFF"/>
+                </a:solidFill>
+              </a14:hiddenFill>
+            </a:ext>
+          </a:extLst>
+        </p:spPr>
+      </p:pic>
     </p:spTree>
     <p:extLst>
       <p:ext uri="{BB962C8B-B14F-4D97-AF65-F5344CB8AC3E}">
-        <p14:creationId xmlns:p14="http://schemas.microsoft.com/office/powerpoint/2010/main" val="777956397"/>
+        <p14:creationId xmlns:p14="http://schemas.microsoft.com/office/powerpoint/2010/main" val="1684411646"/>
       </p:ext>
     </p:extLst>
   </p:cSld>
@@ -4509,10 +5185,9 @@
           <a:lstStyle/>
           <a:p>
             <a:r>
-              <a:rPr lang="en-ZA" dirty="0" smtClean="0"/>
-              <a:t>Lectures (as on GitHub)</a:t>
-            </a:r>
-            <a:endParaRPr lang="en-ZA" dirty="0"/>
+              <a:rPr lang="en-ZA" dirty="0"/>
+              <a:t>How will it work? (Overview)</a:t>
+            </a:r>
           </a:p>
         </p:txBody>
       </p:sp>
@@ -4532,125 +5207,40 @@
           <a:lstStyle/>
           <a:p>
             <a:r>
-              <a:rPr lang="en-ZA" dirty="0" smtClean="0"/>
-              <a:t>Lecture 1: </a:t>
-            </a:r>
-            <a:r>
-              <a:rPr lang="en-US" dirty="0"/>
-              <a:t>Introduction to </a:t>
-            </a:r>
-            <a:r>
-              <a:rPr lang="en-US" dirty="0" smtClean="0"/>
-              <a:t>remote sensing </a:t>
-            </a:r>
-            <a:r>
-              <a:rPr lang="en-US" dirty="0"/>
-              <a:t>of Earth</a:t>
-            </a:r>
-            <a:endParaRPr lang="en-ZA" dirty="0" smtClean="0"/>
-          </a:p>
-          <a:p>
-            <a:r>
-              <a:rPr lang="en-ZA" dirty="0" smtClean="0"/>
-              <a:t>Lecture 2: Creating training datasets</a:t>
-            </a:r>
-          </a:p>
-          <a:p>
-            <a:r>
-              <a:rPr lang="en-ZA" dirty="0" smtClean="0"/>
-              <a:t>Lecture 3: Introduction to machine learning</a:t>
-            </a:r>
-          </a:p>
-          <a:p>
-            <a:r>
-              <a:rPr lang="en-ZA" dirty="0" smtClean="0"/>
-              <a:t>Lecture 4: Clustering and classification</a:t>
-            </a:r>
-          </a:p>
-          <a:p>
-            <a:r>
-              <a:rPr lang="en-ZA" dirty="0" smtClean="0"/>
-              <a:t>Lecture 5: Intro to STAC + Radiant MLHub</a:t>
-            </a:r>
-          </a:p>
-          <a:p>
-            <a:r>
-              <a:rPr lang="en-ZA" dirty="0" smtClean="0"/>
-              <a:t>Lecture 6: A hands-on training for machine learning in Python</a:t>
-            </a:r>
-          </a:p>
-          <a:p>
-            <a:r>
-              <a:rPr lang="en-ZA" dirty="0" smtClean="0"/>
-              <a:t>Lecture 7: An introduction to machine learning with Digital Earth Africa</a:t>
-            </a:r>
-          </a:p>
-          <a:p>
-            <a:r>
-              <a:rPr lang="en-ZA" dirty="0" smtClean="0"/>
-              <a:t>Lecture 8: Machine learning applications in land cover mapping</a:t>
-            </a:r>
-          </a:p>
-          <a:p>
-            <a:r>
-              <a:rPr lang="en-ZA" dirty="0" smtClean="0"/>
-              <a:t>Lecture 9: Crop detection from satellite imagery using deep learning</a:t>
-            </a:r>
-          </a:p>
-          <a:p>
-            <a:r>
-              <a:rPr lang="en-ZA" dirty="0" smtClean="0"/>
-              <a:t>Lecture 10: Tropical cyclone wind estimation from satellite imagery</a:t>
-            </a:r>
-          </a:p>
-        </p:txBody>
-      </p:sp>
-      <p:sp>
-        <p:nvSpPr>
-          <p:cNvPr id="4" name="Cloud Callout 3"/>
-          <p:cNvSpPr/>
-          <p:nvPr/>
-        </p:nvSpPr>
-        <p:spPr>
-          <a:xfrm>
-            <a:off x="8229601" y="642594"/>
-            <a:ext cx="3385750" cy="2273601"/>
-          </a:xfrm>
-          <a:prstGeom prst="cloudCallout">
-            <a:avLst/>
-          </a:prstGeom>
-        </p:spPr>
-        <p:style>
-          <a:lnRef idx="2">
-            <a:schemeClr val="accent2"/>
-          </a:lnRef>
-          <a:fillRef idx="1">
-            <a:schemeClr val="lt1"/>
-          </a:fillRef>
-          <a:effectRef idx="0">
-            <a:schemeClr val="accent2"/>
-          </a:effectRef>
-          <a:fontRef idx="minor">
-            <a:schemeClr val="dk1"/>
-          </a:fontRef>
-        </p:style>
-        <p:txBody>
-          <a:bodyPr rtlCol="0" anchor="ctr"/>
-          <a:lstStyle/>
-          <a:p>
-            <a:pPr algn="ctr"/>
-            <a:r>
-              <a:rPr lang="en-ZA" sz="1600" dirty="0" smtClean="0"/>
-              <a:t>“Lecture 11 Effective teaching” is not in scope, but you are welcome to go through it on your own time.</a:t>
-            </a:r>
-            <a:endParaRPr lang="en-ZA" sz="1600" dirty="0"/>
+              <a:rPr lang="en-ZA" dirty="0"/>
+              <a:t>10 individual lectures</a:t>
+            </a:r>
+          </a:p>
+          <a:p>
+            <a:r>
+              <a:rPr lang="en-ZA" dirty="0"/>
+              <a:t>We will cover the work in 4 days of 3 hours each.</a:t>
+            </a:r>
+          </a:p>
+          <a:p>
+            <a:r>
+              <a:rPr lang="en-ZA" dirty="0"/>
+              <a:t>Different backgrounds of attendees – some of the information will be very familiar to some of you, some will be new.</a:t>
+            </a:r>
+          </a:p>
+          <a:p>
+            <a:r>
+              <a:rPr lang="en-ZA" dirty="0"/>
+              <a:t>At the end of the workshop: e-mail ML4EO organisers confirming that you were trained. (This ensures I get my training-of-trainers certificate!)</a:t>
+            </a:r>
+          </a:p>
+          <a:p>
+            <a:pPr marL="0" indent="0">
+              <a:buNone/>
+            </a:pPr>
+            <a:endParaRPr lang="en-ZA" dirty="0"/>
           </a:p>
         </p:txBody>
       </p:sp>
     </p:spTree>
     <p:extLst>
       <p:ext uri="{BB962C8B-B14F-4D97-AF65-F5344CB8AC3E}">
-        <p14:creationId xmlns:p14="http://schemas.microsoft.com/office/powerpoint/2010/main" val="757111849"/>
+        <p14:creationId xmlns:p14="http://schemas.microsoft.com/office/powerpoint/2010/main" val="3362037340"/>
       </p:ext>
     </p:extLst>
   </p:cSld>
@@ -4693,10 +5283,288 @@
           <a:lstStyle/>
           <a:p>
             <a:r>
-              <a:rPr lang="en-ZA" dirty="0" smtClean="0"/>
+              <a:rPr lang="en-ZA" dirty="0"/>
+              <a:t>How will it work? (Detail)</a:t>
+            </a:r>
+          </a:p>
+        </p:txBody>
+      </p:sp>
+      <p:sp>
+        <p:nvSpPr>
+          <p:cNvPr id="3" name="Content Placeholder 2"/>
+          <p:cNvSpPr>
+            <a:spLocks noGrp="1"/>
+          </p:cNvSpPr>
+          <p:nvPr>
+            <p:ph idx="1"/>
+          </p:nvPr>
+        </p:nvSpPr>
+        <p:spPr/>
+        <p:txBody>
+          <a:bodyPr/>
+          <a:lstStyle/>
+          <a:p>
+            <a:r>
+              <a:rPr lang="en-ZA" dirty="0"/>
+              <a:t>All materials available on GitHub: </a:t>
+            </a:r>
+            <a:r>
+              <a:rPr lang="en-ZA" dirty="0">
+                <a:hlinkClick r:id="rId2"/>
+              </a:rPr>
+              <a:t>https://github.com/RadiantMLHub/ml4eo-bootcamp-2021</a:t>
+            </a:r>
+            <a:endParaRPr lang="en-ZA" dirty="0"/>
+          </a:p>
+          <a:p>
+            <a:r>
+              <a:rPr lang="en-ZA" dirty="0"/>
+              <a:t>You are welcome to clone the repository and work locally, especially if you are comfortable with GitHub and Python.</a:t>
+            </a:r>
+          </a:p>
+          <a:p>
+            <a:r>
+              <a:rPr lang="en-ZA" dirty="0"/>
+              <a:t>You will need Python 3.8 – see the readme in GitHub for dependencies.</a:t>
+            </a:r>
+          </a:p>
+          <a:p>
+            <a:r>
+              <a:rPr lang="en-ZA" dirty="0"/>
+              <a:t>Most of the work is available in Bindr or Google Colab.</a:t>
+            </a:r>
+          </a:p>
+          <a:p>
+            <a:r>
+              <a:rPr lang="en-ZA" dirty="0"/>
+              <a:t>I will be running the programs in the cloud, as provided by the workshop organisers, to minimise issues with Python installation.</a:t>
+            </a:r>
+          </a:p>
+        </p:txBody>
+      </p:sp>
+    </p:spTree>
+    <p:extLst>
+      <p:ext uri="{BB962C8B-B14F-4D97-AF65-F5344CB8AC3E}">
+        <p14:creationId xmlns:p14="http://schemas.microsoft.com/office/powerpoint/2010/main" val="777956397"/>
+      </p:ext>
+    </p:extLst>
+  </p:cSld>
+  <p:clrMapOvr>
+    <a:masterClrMapping/>
+  </p:clrMapOvr>
+</p:sld>
+</file>
+
+<file path=ppt/slides/slide6.xml><?xml version="1.0" encoding="utf-8"?>
+<p:sld xmlns:a="http://schemas.openxmlformats.org/drawingml/2006/main" xmlns:r="http://schemas.openxmlformats.org/officeDocument/2006/relationships" xmlns:p="http://schemas.openxmlformats.org/presentationml/2006/main">
+  <p:cSld>
+    <p:spTree>
+      <p:nvGrpSpPr>
+        <p:cNvPr id="1" name=""/>
+        <p:cNvGrpSpPr/>
+        <p:nvPr/>
+      </p:nvGrpSpPr>
+      <p:grpSpPr>
+        <a:xfrm>
+          <a:off x="0" y="0"/>
+          <a:ext cx="0" cy="0"/>
+          <a:chOff x="0" y="0"/>
+          <a:chExt cx="0" cy="0"/>
+        </a:xfrm>
+      </p:grpSpPr>
+      <p:sp>
+        <p:nvSpPr>
+          <p:cNvPr id="2" name="Title 1"/>
+          <p:cNvSpPr>
+            <a:spLocks noGrp="1"/>
+          </p:cNvSpPr>
+          <p:nvPr>
+            <p:ph type="title"/>
+          </p:nvPr>
+        </p:nvSpPr>
+        <p:spPr/>
+        <p:txBody>
+          <a:bodyPr/>
+          <a:lstStyle/>
+          <a:p>
+            <a:r>
+              <a:rPr lang="en-ZA" dirty="0"/>
+              <a:t>Lectures (as on GitHub)</a:t>
+            </a:r>
+          </a:p>
+        </p:txBody>
+      </p:sp>
+      <p:sp>
+        <p:nvSpPr>
+          <p:cNvPr id="3" name="Content Placeholder 2"/>
+          <p:cNvSpPr>
+            <a:spLocks noGrp="1"/>
+          </p:cNvSpPr>
+          <p:nvPr>
+            <p:ph idx="1"/>
+          </p:nvPr>
+        </p:nvSpPr>
+        <p:spPr/>
+        <p:txBody>
+          <a:bodyPr/>
+          <a:lstStyle/>
+          <a:p>
+            <a:r>
+              <a:rPr lang="en-ZA" dirty="0"/>
+              <a:t>Lecture 1: </a:t>
+            </a:r>
+            <a:r>
+              <a:rPr lang="en-US" dirty="0"/>
+              <a:t>Introduction to remote sensing of Earth</a:t>
+            </a:r>
+            <a:endParaRPr lang="en-ZA" dirty="0"/>
+          </a:p>
+          <a:p>
+            <a:r>
+              <a:rPr lang="en-ZA" dirty="0"/>
+              <a:t>Lecture 2: Creating training datasets</a:t>
+            </a:r>
+          </a:p>
+          <a:p>
+            <a:r>
+              <a:rPr lang="en-ZA" dirty="0"/>
+              <a:t>Lecture 3: Introduction to machine learning</a:t>
+            </a:r>
+          </a:p>
+          <a:p>
+            <a:r>
+              <a:rPr lang="en-ZA" dirty="0"/>
+              <a:t>Lecture 4: Clustering and classification</a:t>
+            </a:r>
+          </a:p>
+          <a:p>
+            <a:r>
+              <a:rPr lang="en-ZA" dirty="0"/>
+              <a:t>Lecture 5: Intro to STAC + Radiant MLHub</a:t>
+            </a:r>
+          </a:p>
+          <a:p>
+            <a:r>
+              <a:rPr lang="en-ZA" dirty="0"/>
+              <a:t>Lecture 6: A hands-on training for machine learning in Python</a:t>
+            </a:r>
+          </a:p>
+          <a:p>
+            <a:r>
+              <a:rPr lang="en-ZA" dirty="0"/>
+              <a:t>Lecture 7: An introduction to machine learning with Digital Earth Africa</a:t>
+            </a:r>
+          </a:p>
+          <a:p>
+            <a:r>
+              <a:rPr lang="en-ZA" dirty="0"/>
+              <a:t>Lecture 8: Machine learning applications in land cover mapping</a:t>
+            </a:r>
+          </a:p>
+          <a:p>
+            <a:r>
+              <a:rPr lang="en-ZA" dirty="0"/>
+              <a:t>Lecture 9: Crop detection from satellite imagery using deep learning</a:t>
+            </a:r>
+          </a:p>
+          <a:p>
+            <a:r>
+              <a:rPr lang="en-ZA" dirty="0"/>
+              <a:t>Lecture 10: Tropical cyclone wind estimation from satellite imagery</a:t>
+            </a:r>
+          </a:p>
+        </p:txBody>
+      </p:sp>
+      <p:sp>
+        <p:nvSpPr>
+          <p:cNvPr id="4" name="Cloud Callout 3"/>
+          <p:cNvSpPr/>
+          <p:nvPr/>
+        </p:nvSpPr>
+        <p:spPr>
+          <a:xfrm>
+            <a:off x="8229601" y="642594"/>
+            <a:ext cx="3385750" cy="2273601"/>
+          </a:xfrm>
+          <a:prstGeom prst="cloudCallout">
+            <a:avLst/>
+          </a:prstGeom>
+        </p:spPr>
+        <p:style>
+          <a:lnRef idx="2">
+            <a:schemeClr val="accent2"/>
+          </a:lnRef>
+          <a:fillRef idx="1">
+            <a:schemeClr val="lt1"/>
+          </a:fillRef>
+          <a:effectRef idx="0">
+            <a:schemeClr val="accent2"/>
+          </a:effectRef>
+          <a:fontRef idx="minor">
+            <a:schemeClr val="dk1"/>
+          </a:fontRef>
+        </p:style>
+        <p:txBody>
+          <a:bodyPr rtlCol="0" anchor="ctr"/>
+          <a:lstStyle/>
+          <a:p>
+            <a:pPr algn="ctr"/>
+            <a:r>
+              <a:rPr lang="en-ZA" sz="1600" dirty="0"/>
+              <a:t>“Lecture 11 Effective teaching” is not in scope, but you are welcome to go through it on your own time.</a:t>
+            </a:r>
+          </a:p>
+        </p:txBody>
+      </p:sp>
+    </p:spTree>
+    <p:extLst>
+      <p:ext uri="{BB962C8B-B14F-4D97-AF65-F5344CB8AC3E}">
+        <p14:creationId xmlns:p14="http://schemas.microsoft.com/office/powerpoint/2010/main" val="757111849"/>
+      </p:ext>
+    </p:extLst>
+  </p:cSld>
+  <p:clrMapOvr>
+    <a:masterClrMapping/>
+  </p:clrMapOvr>
+</p:sld>
+</file>
+
+<file path=ppt/slides/slide7.xml><?xml version="1.0" encoding="utf-8"?>
+<p:sld xmlns:a="http://schemas.openxmlformats.org/drawingml/2006/main" xmlns:r="http://schemas.openxmlformats.org/officeDocument/2006/relationships" xmlns:p="http://schemas.openxmlformats.org/presentationml/2006/main">
+  <p:cSld>
+    <p:spTree>
+      <p:nvGrpSpPr>
+        <p:cNvPr id="1" name=""/>
+        <p:cNvGrpSpPr/>
+        <p:nvPr/>
+      </p:nvGrpSpPr>
+      <p:grpSpPr>
+        <a:xfrm>
+          <a:off x="0" y="0"/>
+          <a:ext cx="0" cy="0"/>
+          <a:chOff x="0" y="0"/>
+          <a:chExt cx="0" cy="0"/>
+        </a:xfrm>
+      </p:grpSpPr>
+      <p:sp>
+        <p:nvSpPr>
+          <p:cNvPr id="2" name="Title 1"/>
+          <p:cNvSpPr>
+            <a:spLocks noGrp="1"/>
+          </p:cNvSpPr>
+          <p:nvPr>
+            <p:ph type="title"/>
+          </p:nvPr>
+        </p:nvSpPr>
+        <p:spPr/>
+        <p:txBody>
+          <a:bodyPr/>
+          <a:lstStyle/>
+          <a:p>
+            <a:r>
+              <a:rPr lang="en-ZA" dirty="0"/>
               <a:t>Our Lectures (adaptable)</a:t>
             </a:r>
-            <a:endParaRPr lang="en-ZA" dirty="0"/>
           </a:p>
         </p:txBody>
       </p:sp>
@@ -4723,78 +5591,56 @@
           <a:lstStyle/>
           <a:p>
             <a:r>
-              <a:rPr lang="en-ZA" dirty="0" smtClean="0"/>
+              <a:rPr lang="en-ZA" dirty="0"/>
               <a:t>Day 1 (9 July):</a:t>
             </a:r>
           </a:p>
           <a:p>
             <a:pPr lvl="1"/>
             <a:r>
-              <a:rPr lang="en-ZA" dirty="0" smtClean="0"/>
-              <a:t>Session 1: Intro to the workshop; Lecture 1</a:t>
+              <a:rPr lang="en-ZA" dirty="0"/>
+              <a:t>Session 1: Intro to the workshop</a:t>
             </a:r>
           </a:p>
           <a:p>
             <a:pPr lvl="1"/>
             <a:r>
-              <a:rPr lang="en-ZA" dirty="0" smtClean="0"/>
-              <a:t>Session 2: Lecture 2</a:t>
+              <a:rPr lang="en-ZA" dirty="0"/>
+              <a:t>Session 2: Lecture 1</a:t>
             </a:r>
           </a:p>
           <a:p>
             <a:pPr lvl="1"/>
             <a:r>
-              <a:rPr lang="en-ZA" dirty="0" smtClean="0"/>
-              <a:t>Session 3: Lecture 3</a:t>
-            </a:r>
-          </a:p>
-          <a:p>
-            <a:r>
-              <a:rPr lang="en-ZA" dirty="0" smtClean="0"/>
-              <a:t>Day 2 (16 </a:t>
-            </a:r>
-            <a:r>
-              <a:rPr lang="en-ZA" dirty="0"/>
-              <a:t>July)</a:t>
-            </a:r>
-            <a:r>
-              <a:rPr lang="en-ZA" dirty="0" smtClean="0"/>
-              <a:t>:</a:t>
+              <a:rPr lang="en-ZA" dirty="0"/>
+              <a:t>Session 3: Lecture 2</a:t>
+            </a:r>
+          </a:p>
+          <a:p>
+            <a:r>
+              <a:rPr lang="en-ZA" dirty="0"/>
+              <a:t>Day 2 (16 July):</a:t>
             </a:r>
           </a:p>
           <a:p>
             <a:pPr lvl="1"/>
             <a:r>
               <a:rPr lang="en-ZA" dirty="0"/>
-              <a:t>Session 1</a:t>
-            </a:r>
-            <a:r>
-              <a:rPr lang="en-ZA" dirty="0" smtClean="0"/>
-              <a:t>: Lecture 4</a:t>
-            </a:r>
-            <a:endParaRPr lang="en-ZA" dirty="0"/>
+              <a:t>Session 1: Lecture 3</a:t>
+            </a:r>
           </a:p>
           <a:p>
             <a:pPr lvl="1"/>
             <a:r>
               <a:rPr lang="en-ZA" dirty="0"/>
-              <a:t>Session 2</a:t>
-            </a:r>
-            <a:r>
-              <a:rPr lang="en-ZA" dirty="0" smtClean="0"/>
-              <a:t>: Lecture 5</a:t>
-            </a:r>
-            <a:endParaRPr lang="en-ZA" dirty="0"/>
+              <a:t>Session 2: Lecture 4</a:t>
+            </a:r>
           </a:p>
           <a:p>
             <a:pPr lvl="1"/>
             <a:r>
               <a:rPr lang="en-ZA" dirty="0"/>
-              <a:t>Session 3</a:t>
-            </a:r>
-            <a:r>
-              <a:rPr lang="en-ZA" dirty="0" smtClean="0"/>
-              <a:t>: Lecture 6</a:t>
+              <a:t>Session 3: Lecture 5</a:t>
             </a:r>
           </a:p>
         </p:txBody>
@@ -5043,72 +5889,56 @@
           </a:lstStyle>
           <a:p>
             <a:r>
-              <a:rPr lang="en-ZA" dirty="0" smtClean="0"/>
-              <a:t>Day 3 (23 </a:t>
-            </a:r>
-            <a:r>
-              <a:rPr lang="en-ZA" dirty="0"/>
-              <a:t>July)</a:t>
-            </a:r>
-            <a:r>
-              <a:rPr lang="en-ZA" dirty="0" smtClean="0"/>
-              <a:t>:</a:t>
+              <a:rPr lang="en-ZA" dirty="0"/>
+              <a:t>Day 3 (23 July):</a:t>
             </a:r>
           </a:p>
           <a:p>
             <a:pPr lvl="1"/>
             <a:r>
-              <a:rPr lang="en-ZA" dirty="0" smtClean="0"/>
-              <a:t>Session 1: Lecture 7</a:t>
+              <a:rPr lang="en-ZA" dirty="0"/>
+              <a:t>Session 1: Lecture 6</a:t>
             </a:r>
           </a:p>
           <a:p>
             <a:pPr lvl="1"/>
             <a:r>
-              <a:rPr lang="en-ZA" dirty="0" smtClean="0"/>
-              <a:t>Session 2: Lecture 8</a:t>
+              <a:rPr lang="en-ZA" dirty="0"/>
+              <a:t>Session 2: Lecture 7</a:t>
             </a:r>
           </a:p>
           <a:p>
             <a:pPr lvl="1"/>
             <a:r>
-              <a:rPr lang="en-ZA" dirty="0" smtClean="0"/>
-              <a:t>Session 3: Lecture 9</a:t>
-            </a:r>
-          </a:p>
-          <a:p>
-            <a:r>
-              <a:rPr lang="en-ZA" dirty="0" smtClean="0"/>
-              <a:t>Day 4 (30 </a:t>
-            </a:r>
-            <a:r>
-              <a:rPr lang="en-ZA" dirty="0"/>
-              <a:t>July</a:t>
-            </a:r>
-            <a:r>
-              <a:rPr lang="en-ZA" dirty="0" smtClean="0"/>
-              <a:t>):</a:t>
+              <a:rPr lang="en-ZA" dirty="0"/>
+              <a:t>Session 3: Lecture 8</a:t>
+            </a:r>
+          </a:p>
+          <a:p>
+            <a:r>
+              <a:rPr lang="en-ZA" dirty="0"/>
+              <a:t>Day 4 (30 July):</a:t>
             </a:r>
           </a:p>
           <a:p>
             <a:pPr lvl="1"/>
             <a:r>
-              <a:rPr lang="en-ZA" dirty="0" smtClean="0"/>
-              <a:t>Session 1: Lecture 10</a:t>
+              <a:rPr lang="en-ZA" dirty="0"/>
+              <a:t>Session 1: Lecture 9</a:t>
             </a:r>
           </a:p>
           <a:p>
             <a:pPr lvl="1"/>
             <a:r>
-              <a:rPr lang="en-ZA" dirty="0" smtClean="0"/>
-              <a:t>Session 2: Discussion</a:t>
+              <a:rPr lang="en-ZA" dirty="0"/>
+              <a:t>Session 2: Lecture 10</a:t>
             </a:r>
           </a:p>
           <a:p>
             <a:pPr lvl="1"/>
             <a:r>
-              <a:rPr lang="en-ZA" dirty="0" smtClean="0"/>
-              <a:t>Session 3: [Open]</a:t>
+              <a:rPr lang="en-ZA" dirty="0"/>
+              <a:t>Session 3: Discussion</a:t>
             </a:r>
           </a:p>
           <a:p>
@@ -5152,16 +5982,15 @@
           <a:lstStyle/>
           <a:p>
             <a:r>
-              <a:rPr lang="en-ZA" dirty="0" smtClean="0"/>
+              <a:rPr lang="en-ZA" dirty="0"/>
               <a:t>This structure is flexible; some topics might go quicker while others may take longer; we will see what happens!</a:t>
             </a:r>
           </a:p>
           <a:p>
             <a:r>
-              <a:rPr lang="en-ZA" dirty="0" smtClean="0"/>
+              <a:rPr lang="en-ZA" dirty="0"/>
               <a:t>The program can be found here: https://github.com/renatet/ML4EO-Resources</a:t>
             </a:r>
-            <a:endParaRPr lang="en-ZA" dirty="0"/>
           </a:p>
         </p:txBody>
       </p:sp>
@@ -5178,7 +6007,7 @@
 </p:sld>
 </file>
 
-<file path=ppt/slides/slide6.xml><?xml version="1.0" encoding="utf-8"?>
+<file path=ppt/slides/slide8.xml><?xml version="1.0" encoding="utf-8"?>
 <p:sld xmlns:a="http://schemas.openxmlformats.org/drawingml/2006/main" xmlns:r="http://schemas.openxmlformats.org/officeDocument/2006/relationships" xmlns:p="http://schemas.openxmlformats.org/presentationml/2006/main">
   <p:cSld>
     <p:spTree>
@@ -5211,10 +6040,9 @@
           <a:lstStyle/>
           <a:p>
             <a:r>
-              <a:rPr lang="en-ZA" dirty="0" smtClean="0"/>
+              <a:rPr lang="en-ZA" dirty="0"/>
               <a:t>Finally...</a:t>
             </a:r>
-            <a:endParaRPr lang="en-ZA" dirty="0"/>
           </a:p>
         </p:txBody>
       </p:sp>
@@ -5239,58 +6067,33 @@
           <a:lstStyle/>
           <a:p>
             <a:r>
-              <a:rPr lang="en-ZA" dirty="0" smtClean="0"/>
+              <a:rPr lang="en-ZA" dirty="0"/>
               <a:t>This workshop is supposed to be interactive!</a:t>
             </a:r>
           </a:p>
           <a:p>
             <a:r>
               <a:rPr lang="en-ZA" dirty="0"/>
-              <a:t>No point to just repeat the </a:t>
-            </a:r>
-            <a:r>
-              <a:rPr lang="en-ZA" dirty="0" smtClean="0"/>
-              <a:t>slides &amp; notebooks </a:t>
-            </a:r>
-            <a:r>
-              <a:rPr lang="en-ZA" dirty="0"/>
-              <a:t>word-for-word – we wouldn’t need a workshop in that case</a:t>
-            </a:r>
-            <a:r>
-              <a:rPr lang="en-ZA" dirty="0" smtClean="0"/>
-              <a:t>...</a:t>
-            </a:r>
-          </a:p>
-          <a:p>
-            <a:r>
-              <a:rPr lang="en-ZA" dirty="0" smtClean="0"/>
-              <a:t>The materials are </a:t>
-            </a:r>
-            <a:r>
-              <a:rPr lang="en-ZA" dirty="0"/>
-              <a:t>available indefinitely, so you can always go back to them </a:t>
-            </a:r>
-            <a:r>
-              <a:rPr lang="en-ZA" dirty="0" smtClean="0"/>
-              <a:t>in your own time (especially if you clone/download them).</a:t>
-            </a:r>
-          </a:p>
-          <a:p>
-            <a:r>
-              <a:rPr lang="en-ZA" dirty="0" smtClean="0"/>
+              <a:t>No point to just repeat the slides &amp; notebooks word-for-word – we wouldn’t need a workshop in that case...</a:t>
+            </a:r>
+          </a:p>
+          <a:p>
+            <a:r>
+              <a:rPr lang="en-ZA" dirty="0"/>
+              <a:t>The materials are available indefinitely, so you can always go back to them in your own time (especially if you clone/download them).</a:t>
+            </a:r>
+          </a:p>
+          <a:p>
+            <a:r>
+              <a:rPr lang="en-ZA" dirty="0"/>
               <a:t>The value of these sessions will be in the discussions we have. </a:t>
             </a:r>
           </a:p>
           <a:p>
             <a:r>
               <a:rPr lang="en-ZA" dirty="0"/>
-              <a:t>So feel free to comment and interject as we go </a:t>
-            </a:r>
-            <a:r>
-              <a:rPr lang="en-ZA" dirty="0" smtClean="0"/>
-              <a:t>along!</a:t>
-            </a:r>
-            <a:endParaRPr lang="en-ZA" dirty="0"/>
+              <a:t>So feel free to comment and interject as we go along!</a:t>
+            </a:r>
           </a:p>
         </p:txBody>
       </p:sp>

</xml_diff>